<commit_message>
pruned data\chrom-and-gnsz.csv to exclude unanalyzed ncbi genomes
</commit_message>
<xml_diff>
--- a/figures/fig5/fig5.pptx
+++ b/figures/fig5/fig5.pptx
@@ -5,11 +5,13 @@
     <p:sldMasterId id="2147483648" r:id="rId1"/>
   </p:sldMasterIdLst>
   <p:notesMasterIdLst>
-    <p:notesMasterId r:id="rId4"/>
+    <p:notesMasterId r:id="rId6"/>
   </p:notesMasterIdLst>
   <p:sldIdLst>
     <p:sldId id="256" r:id="rId2"/>
     <p:sldId id="257" r:id="rId3"/>
+    <p:sldId id="258" r:id="rId4"/>
+    <p:sldId id="259" r:id="rId5"/>
   </p:sldIdLst>
   <p:sldSz cx="36576000" cy="32918400"/>
   <p:notesSz cx="7010400" cy="9296400"/>
@@ -258,7 +260,7 @@
       </p15:sldGuideLst>
     </p:ext>
     <p:ext uri="http://customooxmlschemas.google.com/">
-      <go:slidesCustomData xmlns="" xmlns:mc="http://schemas.openxmlformats.org/markup-compatibility/2006" xmlns:mv="urn:schemas-microsoft-com:mac:vml" xmlns:c="http://schemas.openxmlformats.org/drawingml/2006/chart" xmlns:dgm="http://schemas.openxmlformats.org/drawingml/2006/diagram" xmlns:o="urn:schemas-microsoft-com:office:office" xmlns:v="urn:schemas-microsoft-com:vml" xmlns:pvml="urn:schemas-microsoft-com:office:powerpoint" xmlns:com="http://schemas.openxmlformats.org/drawingml/2006/compatibility" xmlns:p14="http://schemas.microsoft.com/office/powerpoint/2010/main" xmlns:p15="http://schemas.microsoft.com/office/powerpoint/2012/main" xmlns:ahyp="http://schemas.microsoft.com/office/drawing/2018/hyperlinkcolor" xmlns:go="http://customooxmlschemas.google.com/" r:id="rId10" roundtripDataSignature="AMtx7mhiytGPk8UOxiAGs9KaAxakDbg4SQ=="/>
+      <go:slidesCustomData xmlns:go="http://customooxmlschemas.google.com/" xmlns:ahyp="http://schemas.microsoft.com/office/drawing/2018/hyperlinkcolor" xmlns:p15="http://schemas.microsoft.com/office/powerpoint/2012/main" xmlns:p14="http://schemas.microsoft.com/office/powerpoint/2010/main" xmlns:com="http://schemas.openxmlformats.org/drawingml/2006/compatibility" xmlns:pvml="urn:schemas-microsoft-com:office:powerpoint" xmlns:v="urn:schemas-microsoft-com:vml" xmlns:o="urn:schemas-microsoft-com:office:office" xmlns:dgm="http://schemas.openxmlformats.org/drawingml/2006/diagram" xmlns:c="http://schemas.openxmlformats.org/drawingml/2006/chart" xmlns:mv="urn:schemas-microsoft-com:mac:vml" xmlns:mc="http://schemas.openxmlformats.org/markup-compatibility/2006" xmlns="" r:id="rId10" roundtripDataSignature="AMtx7mhiytGPk8UOxiAGs9KaAxakDbg4SQ=="/>
     </p:ext>
   </p:extLst>
 </p:presentation>
@@ -1837,6 +1839,424 @@
     <p:extLst>
       <p:ext uri="{BB962C8B-B14F-4D97-AF65-F5344CB8AC3E}">
         <p14:creationId xmlns:p14="http://schemas.microsoft.com/office/powerpoint/2010/main" val="2417805071"/>
+      </p:ext>
+    </p:extLst>
+  </p:cSld>
+  <p:clrMapOvr>
+    <a:masterClrMapping/>
+  </p:clrMapOvr>
+</p:notes>
+</file>
+
+<file path=ppt/notesSlides/notesSlide3.xml><?xml version="1.0" encoding="utf-8"?>
+<p:notes xmlns:a="http://schemas.openxmlformats.org/drawingml/2006/main" xmlns:r="http://schemas.openxmlformats.org/officeDocument/2006/relationships" xmlns:p="http://schemas.openxmlformats.org/presentationml/2006/main" showMasterSp="0" showMasterPhAnim="0">
+  <p:cSld>
+    <p:spTree>
+      <p:nvGrpSpPr>
+        <p:cNvPr id="1" name="Shape 84">
+          <a:extLst>
+            <a:ext uri="{FF2B5EF4-FFF2-40B4-BE49-F238E27FC236}">
+              <a16:creationId xmlns:a16="http://schemas.microsoft.com/office/drawing/2014/main" id="{77FED2ED-BE68-0558-1BA1-3A31B194C30A}"/>
+            </a:ext>
+          </a:extLst>
+        </p:cNvPr>
+        <p:cNvGrpSpPr/>
+        <p:nvPr/>
+      </p:nvGrpSpPr>
+      <p:grpSpPr>
+        <a:xfrm>
+          <a:off x="0" y="0"/>
+          <a:ext cx="0" cy="0"/>
+          <a:chOff x="0" y="0"/>
+          <a:chExt cx="0" cy="0"/>
+        </a:xfrm>
+      </p:grpSpPr>
+      <p:sp>
+        <p:nvSpPr>
+          <p:cNvPr id="85" name="Google Shape;85;p1:notes">
+            <a:extLst>
+              <a:ext uri="{FF2B5EF4-FFF2-40B4-BE49-F238E27FC236}">
+                <a16:creationId xmlns:a16="http://schemas.microsoft.com/office/drawing/2014/main" id="{13541BB7-5E3B-723C-0C0B-E5E8C1156EBA}"/>
+              </a:ext>
+            </a:extLst>
+          </p:cNvPr>
+          <p:cNvSpPr>
+            <a:spLocks noGrp="1" noRot="1" noChangeAspect="1"/>
+          </p:cNvSpPr>
+          <p:nvPr>
+            <p:ph type="sldImg" idx="2"/>
+          </p:nvPr>
+        </p:nvSpPr>
+        <p:spPr>
+          <a:xfrm>
+            <a:off x="1568450" y="696913"/>
+            <a:ext cx="3873500" cy="3486150"/>
+          </a:xfrm>
+          <a:custGeom>
+            <a:avLst/>
+            <a:gdLst/>
+            <a:ahLst/>
+            <a:cxnLst/>
+            <a:rect l="l" t="t" r="r" b="b"/>
+            <a:pathLst>
+              <a:path w="120000" h="120000" extrusionOk="0">
+                <a:moveTo>
+                  <a:pt x="0" y="0"/>
+                </a:moveTo>
+                <a:lnTo>
+                  <a:pt x="120000" y="0"/>
+                </a:lnTo>
+                <a:lnTo>
+                  <a:pt x="120000" y="120000"/>
+                </a:lnTo>
+                <a:lnTo>
+                  <a:pt x="0" y="120000"/>
+                </a:lnTo>
+                <a:close/>
+              </a:path>
+            </a:pathLst>
+          </a:custGeom>
+          <a:noFill/>
+          <a:ln w="9525" cap="flat" cmpd="sng">
+            <a:solidFill>
+              <a:srgbClr val="000000"/>
+            </a:solidFill>
+            <a:prstDash val="solid"/>
+            <a:miter lim="800000"/>
+            <a:headEnd type="none" w="sm" len="sm"/>
+            <a:tailEnd type="none" w="sm" len="sm"/>
+          </a:ln>
+        </p:spPr>
+      </p:sp>
+      <p:sp>
+        <p:nvSpPr>
+          <p:cNvPr id="86" name="Google Shape;86;p1:notes">
+            <a:extLst>
+              <a:ext uri="{FF2B5EF4-FFF2-40B4-BE49-F238E27FC236}">
+                <a16:creationId xmlns:a16="http://schemas.microsoft.com/office/drawing/2014/main" id="{0B536FB8-C9F2-802C-0971-A20A4CB79511}"/>
+              </a:ext>
+            </a:extLst>
+          </p:cNvPr>
+          <p:cNvSpPr txBox="1">
+            <a:spLocks noGrp="1"/>
+          </p:cNvSpPr>
+          <p:nvPr>
+            <p:ph type="body" idx="1"/>
+          </p:nvPr>
+        </p:nvSpPr>
+        <p:spPr>
+          <a:xfrm>
+            <a:off x="701675" y="4416425"/>
+            <a:ext cx="5607050" cy="4183063"/>
+          </a:xfrm>
+          <a:prstGeom prst="rect">
+            <a:avLst/>
+          </a:prstGeom>
+          <a:noFill/>
+          <a:ln>
+            <a:noFill/>
+          </a:ln>
+        </p:spPr>
+        <p:txBody>
+          <a:bodyPr spcFirstLastPara="1" wrap="square" lIns="93150" tIns="46575" rIns="93150" bIns="46575" anchor="t" anchorCtr="0">
+            <a:noAutofit/>
+          </a:bodyPr>
+          <a:lstStyle/>
+          <a:p>
+            <a:pPr marL="0" lvl="0" indent="0" algn="l" rtl="0">
+              <a:spcBef>
+                <a:spcPts val="0"/>
+              </a:spcBef>
+              <a:spcAft>
+                <a:spcPts val="0"/>
+              </a:spcAft>
+              <a:buNone/>
+            </a:pPr>
+            <a:endParaRPr dirty="0"/>
+          </a:p>
+        </p:txBody>
+      </p:sp>
+      <p:sp>
+        <p:nvSpPr>
+          <p:cNvPr id="87" name="Google Shape;87;p1:notes">
+            <a:extLst>
+              <a:ext uri="{FF2B5EF4-FFF2-40B4-BE49-F238E27FC236}">
+                <a16:creationId xmlns:a16="http://schemas.microsoft.com/office/drawing/2014/main" id="{5D3A8C56-79DB-10DB-6357-BE48743524CC}"/>
+              </a:ext>
+            </a:extLst>
+          </p:cNvPr>
+          <p:cNvSpPr txBox="1">
+            <a:spLocks noGrp="1"/>
+          </p:cNvSpPr>
+          <p:nvPr>
+            <p:ph type="sldNum" idx="12"/>
+          </p:nvPr>
+        </p:nvSpPr>
+        <p:spPr>
+          <a:xfrm>
+            <a:off x="3970338" y="8829675"/>
+            <a:ext cx="3038475" cy="465138"/>
+          </a:xfrm>
+          <a:prstGeom prst="rect">
+            <a:avLst/>
+          </a:prstGeom>
+          <a:noFill/>
+          <a:ln>
+            <a:noFill/>
+          </a:ln>
+        </p:spPr>
+        <p:txBody>
+          <a:bodyPr spcFirstLastPara="1" wrap="square" lIns="93150" tIns="46575" rIns="93150" bIns="46575" anchor="b" anchorCtr="0">
+            <a:noAutofit/>
+          </a:bodyPr>
+          <a:lstStyle/>
+          <a:p>
+            <a:pPr marL="0" marR="0" lvl="0" indent="0" algn="r" rtl="0">
+              <a:spcBef>
+                <a:spcPts val="0"/>
+              </a:spcBef>
+              <a:spcAft>
+                <a:spcPts val="0"/>
+              </a:spcAft>
+              <a:buNone/>
+            </a:pPr>
+            <a:fld id="{00000000-1234-1234-1234-123412341234}" type="slidenum">
+              <a:rPr lang="en-US" sz="1200" b="0" i="0" u="none" strike="noStrike" cap="none">
+                <a:solidFill>
+                  <a:schemeClr val="dk1"/>
+                </a:solidFill>
+                <a:latin typeface="Calibri"/>
+                <a:ea typeface="Calibri"/>
+                <a:cs typeface="Calibri"/>
+                <a:sym typeface="Calibri"/>
+              </a:rPr>
+              <a:t>3</a:t>
+            </a:fld>
+            <a:endParaRPr sz="1200" b="0" i="0" u="none" strike="noStrike" cap="none">
+              <a:solidFill>
+                <a:schemeClr val="dk1"/>
+              </a:solidFill>
+              <a:latin typeface="Calibri"/>
+              <a:ea typeface="Calibri"/>
+              <a:cs typeface="Calibri"/>
+              <a:sym typeface="Calibri"/>
+            </a:endParaRPr>
+          </a:p>
+        </p:txBody>
+      </p:sp>
+    </p:spTree>
+    <p:extLst>
+      <p:ext uri="{BB962C8B-B14F-4D97-AF65-F5344CB8AC3E}">
+        <p14:creationId xmlns:p14="http://schemas.microsoft.com/office/powerpoint/2010/main" val="479466449"/>
+      </p:ext>
+    </p:extLst>
+  </p:cSld>
+  <p:clrMapOvr>
+    <a:masterClrMapping/>
+  </p:clrMapOvr>
+</p:notes>
+</file>
+
+<file path=ppt/notesSlides/notesSlide4.xml><?xml version="1.0" encoding="utf-8"?>
+<p:notes xmlns:a="http://schemas.openxmlformats.org/drawingml/2006/main" xmlns:r="http://schemas.openxmlformats.org/officeDocument/2006/relationships" xmlns:p="http://schemas.openxmlformats.org/presentationml/2006/main" showMasterSp="0" showMasterPhAnim="0">
+  <p:cSld>
+    <p:spTree>
+      <p:nvGrpSpPr>
+        <p:cNvPr id="1" name="Shape 84">
+          <a:extLst>
+            <a:ext uri="{FF2B5EF4-FFF2-40B4-BE49-F238E27FC236}">
+              <a16:creationId xmlns:a16="http://schemas.microsoft.com/office/drawing/2014/main" id="{161CDB38-27BE-EABF-69A0-B5409FE1D879}"/>
+            </a:ext>
+          </a:extLst>
+        </p:cNvPr>
+        <p:cNvGrpSpPr/>
+        <p:nvPr/>
+      </p:nvGrpSpPr>
+      <p:grpSpPr>
+        <a:xfrm>
+          <a:off x="0" y="0"/>
+          <a:ext cx="0" cy="0"/>
+          <a:chOff x="0" y="0"/>
+          <a:chExt cx="0" cy="0"/>
+        </a:xfrm>
+      </p:grpSpPr>
+      <p:sp>
+        <p:nvSpPr>
+          <p:cNvPr id="85" name="Google Shape;85;p1:notes">
+            <a:extLst>
+              <a:ext uri="{FF2B5EF4-FFF2-40B4-BE49-F238E27FC236}">
+                <a16:creationId xmlns:a16="http://schemas.microsoft.com/office/drawing/2014/main" id="{B397397A-2C79-191E-39AC-65AB5500B2B3}"/>
+              </a:ext>
+            </a:extLst>
+          </p:cNvPr>
+          <p:cNvSpPr>
+            <a:spLocks noGrp="1" noRot="1" noChangeAspect="1"/>
+          </p:cNvSpPr>
+          <p:nvPr>
+            <p:ph type="sldImg" idx="2"/>
+          </p:nvPr>
+        </p:nvSpPr>
+        <p:spPr>
+          <a:xfrm>
+            <a:off x="1568450" y="696913"/>
+            <a:ext cx="3873500" cy="3486150"/>
+          </a:xfrm>
+          <a:custGeom>
+            <a:avLst/>
+            <a:gdLst/>
+            <a:ahLst/>
+            <a:cxnLst/>
+            <a:rect l="l" t="t" r="r" b="b"/>
+            <a:pathLst>
+              <a:path w="120000" h="120000" extrusionOk="0">
+                <a:moveTo>
+                  <a:pt x="0" y="0"/>
+                </a:moveTo>
+                <a:lnTo>
+                  <a:pt x="120000" y="0"/>
+                </a:lnTo>
+                <a:lnTo>
+                  <a:pt x="120000" y="120000"/>
+                </a:lnTo>
+                <a:lnTo>
+                  <a:pt x="0" y="120000"/>
+                </a:lnTo>
+                <a:close/>
+              </a:path>
+            </a:pathLst>
+          </a:custGeom>
+          <a:noFill/>
+          <a:ln w="9525" cap="flat" cmpd="sng">
+            <a:solidFill>
+              <a:srgbClr val="000000"/>
+            </a:solidFill>
+            <a:prstDash val="solid"/>
+            <a:miter lim="800000"/>
+            <a:headEnd type="none" w="sm" len="sm"/>
+            <a:tailEnd type="none" w="sm" len="sm"/>
+          </a:ln>
+        </p:spPr>
+      </p:sp>
+      <p:sp>
+        <p:nvSpPr>
+          <p:cNvPr id="86" name="Google Shape;86;p1:notes">
+            <a:extLst>
+              <a:ext uri="{FF2B5EF4-FFF2-40B4-BE49-F238E27FC236}">
+                <a16:creationId xmlns:a16="http://schemas.microsoft.com/office/drawing/2014/main" id="{94B87B3B-84DD-F5A5-605A-E06CBCCC6B69}"/>
+              </a:ext>
+            </a:extLst>
+          </p:cNvPr>
+          <p:cNvSpPr txBox="1">
+            <a:spLocks noGrp="1"/>
+          </p:cNvSpPr>
+          <p:nvPr>
+            <p:ph type="body" idx="1"/>
+          </p:nvPr>
+        </p:nvSpPr>
+        <p:spPr>
+          <a:xfrm>
+            <a:off x="701675" y="4416425"/>
+            <a:ext cx="5607050" cy="4183063"/>
+          </a:xfrm>
+          <a:prstGeom prst="rect">
+            <a:avLst/>
+          </a:prstGeom>
+          <a:noFill/>
+          <a:ln>
+            <a:noFill/>
+          </a:ln>
+        </p:spPr>
+        <p:txBody>
+          <a:bodyPr spcFirstLastPara="1" wrap="square" lIns="93150" tIns="46575" rIns="93150" bIns="46575" anchor="t" anchorCtr="0">
+            <a:noAutofit/>
+          </a:bodyPr>
+          <a:lstStyle/>
+          <a:p>
+            <a:pPr marL="0" lvl="0" indent="0" algn="l" rtl="0">
+              <a:spcBef>
+                <a:spcPts val="0"/>
+              </a:spcBef>
+              <a:spcAft>
+                <a:spcPts val="0"/>
+              </a:spcAft>
+              <a:buNone/>
+            </a:pPr>
+            <a:endParaRPr dirty="0"/>
+          </a:p>
+        </p:txBody>
+      </p:sp>
+      <p:sp>
+        <p:nvSpPr>
+          <p:cNvPr id="87" name="Google Shape;87;p1:notes">
+            <a:extLst>
+              <a:ext uri="{FF2B5EF4-FFF2-40B4-BE49-F238E27FC236}">
+                <a16:creationId xmlns:a16="http://schemas.microsoft.com/office/drawing/2014/main" id="{40F724A6-6DE6-0941-D1B5-CE272A450734}"/>
+              </a:ext>
+            </a:extLst>
+          </p:cNvPr>
+          <p:cNvSpPr txBox="1">
+            <a:spLocks noGrp="1"/>
+          </p:cNvSpPr>
+          <p:nvPr>
+            <p:ph type="sldNum" idx="12"/>
+          </p:nvPr>
+        </p:nvSpPr>
+        <p:spPr>
+          <a:xfrm>
+            <a:off x="3970338" y="8829675"/>
+            <a:ext cx="3038475" cy="465138"/>
+          </a:xfrm>
+          <a:prstGeom prst="rect">
+            <a:avLst/>
+          </a:prstGeom>
+          <a:noFill/>
+          <a:ln>
+            <a:noFill/>
+          </a:ln>
+        </p:spPr>
+        <p:txBody>
+          <a:bodyPr spcFirstLastPara="1" wrap="square" lIns="93150" tIns="46575" rIns="93150" bIns="46575" anchor="b" anchorCtr="0">
+            <a:noAutofit/>
+          </a:bodyPr>
+          <a:lstStyle/>
+          <a:p>
+            <a:pPr marL="0" marR="0" lvl="0" indent="0" algn="r" rtl="0">
+              <a:spcBef>
+                <a:spcPts val="0"/>
+              </a:spcBef>
+              <a:spcAft>
+                <a:spcPts val="0"/>
+              </a:spcAft>
+              <a:buNone/>
+            </a:pPr>
+            <a:fld id="{00000000-1234-1234-1234-123412341234}" type="slidenum">
+              <a:rPr lang="en-US" sz="1200" b="0" i="0" u="none" strike="noStrike" cap="none">
+                <a:solidFill>
+                  <a:schemeClr val="dk1"/>
+                </a:solidFill>
+                <a:latin typeface="Calibri"/>
+                <a:ea typeface="Calibri"/>
+                <a:cs typeface="Calibri"/>
+                <a:sym typeface="Calibri"/>
+              </a:rPr>
+              <a:t>4</a:t>
+            </a:fld>
+            <a:endParaRPr sz="1200" b="0" i="0" u="none" strike="noStrike" cap="none">
+              <a:solidFill>
+                <a:schemeClr val="dk1"/>
+              </a:solidFill>
+              <a:latin typeface="Calibri"/>
+              <a:ea typeface="Calibri"/>
+              <a:cs typeface="Calibri"/>
+              <a:sym typeface="Calibri"/>
+            </a:endParaRPr>
+          </a:p>
+        </p:txBody>
+      </p:sp>
+    </p:spTree>
+    <p:extLst>
+      <p:ext uri="{BB962C8B-B14F-4D97-AF65-F5344CB8AC3E}">
+        <p14:creationId xmlns:p14="http://schemas.microsoft.com/office/powerpoint/2010/main" val="1425333128"/>
       </p:ext>
     </p:extLst>
   </p:cSld>
@@ -10507,6 +10927,167 @@
 </p:sld>
 </file>
 
+<file path=ppt/slides/slide3.xml><?xml version="1.0" encoding="utf-8"?>
+<p:sld xmlns:a="http://schemas.openxmlformats.org/drawingml/2006/main" xmlns:r="http://schemas.openxmlformats.org/officeDocument/2006/relationships" xmlns:p="http://schemas.openxmlformats.org/presentationml/2006/main">
+  <p:cSld>
+    <p:bg>
+      <p:bgPr>
+        <a:solidFill>
+          <a:schemeClr val="lt1"/>
+        </a:solidFill>
+        <a:effectLst/>
+      </p:bgPr>
+    </p:bg>
+    <p:spTree>
+      <p:nvGrpSpPr>
+        <p:cNvPr id="1" name="Shape 88">
+          <a:extLst>
+            <a:ext uri="{FF2B5EF4-FFF2-40B4-BE49-F238E27FC236}">
+              <a16:creationId xmlns:a16="http://schemas.microsoft.com/office/drawing/2014/main" id="{F9B6D7A5-9952-FA9E-9B8B-07CF5E1FFAC3}"/>
+            </a:ext>
+          </a:extLst>
+        </p:cNvPr>
+        <p:cNvGrpSpPr/>
+        <p:nvPr/>
+      </p:nvGrpSpPr>
+      <p:grpSpPr>
+        <a:xfrm>
+          <a:off x="0" y="0"/>
+          <a:ext cx="0" cy="0"/>
+          <a:chOff x="0" y="0"/>
+          <a:chExt cx="0" cy="0"/>
+        </a:xfrm>
+      </p:grpSpPr>
+      <p:pic>
+        <p:nvPicPr>
+          <p:cNvPr id="8" name="Graphic 7">
+            <a:extLst>
+              <a:ext uri="{FF2B5EF4-FFF2-40B4-BE49-F238E27FC236}">
+                <a16:creationId xmlns:a16="http://schemas.microsoft.com/office/drawing/2014/main" id="{548072BA-5DF3-360A-6ED3-E41971F36A0E}"/>
+              </a:ext>
+            </a:extLst>
+          </p:cNvPr>
+          <p:cNvPicPr>
+            <a:picLocks noChangeAspect="1"/>
+          </p:cNvPicPr>
+          <p:nvPr/>
+        </p:nvPicPr>
+        <p:blipFill>
+          <a:blip r:embed="rId3">
+            <a:extLst>
+              <a:ext uri="{96DAC541-7B7A-43D3-8B79-37D633B846F1}">
+                <asvg:svgBlip xmlns:asvg="http://schemas.microsoft.com/office/drawing/2016/SVG/main" r:embed="rId4"/>
+              </a:ext>
+            </a:extLst>
+          </a:blip>
+          <a:srcRect l="2201" t="4343" b="5087"/>
+          <a:stretch>
+            <a:fillRect/>
+          </a:stretch>
+        </p:blipFill>
+        <p:spPr>
+          <a:xfrm>
+            <a:off x="0" y="11191170"/>
+            <a:ext cx="36576000" cy="21727230"/>
+          </a:xfrm>
+          <a:prstGeom prst="rect">
+            <a:avLst/>
+          </a:prstGeom>
+        </p:spPr>
+      </p:pic>
+    </p:spTree>
+    <p:extLst>
+      <p:ext uri="{BB962C8B-B14F-4D97-AF65-F5344CB8AC3E}">
+        <p14:creationId xmlns:p14="http://schemas.microsoft.com/office/powerpoint/2010/main" val="1383361948"/>
+      </p:ext>
+    </p:extLst>
+  </p:cSld>
+  <p:clrMapOvr>
+    <a:masterClrMapping/>
+  </p:clrMapOvr>
+</p:sld>
+</file>
+
+<file path=ppt/slides/slide4.xml><?xml version="1.0" encoding="utf-8"?>
+<p:sld xmlns:a="http://schemas.openxmlformats.org/drawingml/2006/main" xmlns:r="http://schemas.openxmlformats.org/officeDocument/2006/relationships" xmlns:p="http://schemas.openxmlformats.org/presentationml/2006/main">
+  <p:cSld>
+    <p:bg>
+      <p:bgPr>
+        <a:solidFill>
+          <a:schemeClr val="lt1"/>
+        </a:solidFill>
+        <a:effectLst/>
+      </p:bgPr>
+    </p:bg>
+    <p:spTree>
+      <p:nvGrpSpPr>
+        <p:cNvPr id="1" name="Shape 88">
+          <a:extLst>
+            <a:ext uri="{FF2B5EF4-FFF2-40B4-BE49-F238E27FC236}">
+              <a16:creationId xmlns:a16="http://schemas.microsoft.com/office/drawing/2014/main" id="{825B5B23-B1ED-1038-E032-395035DFD1BD}"/>
+            </a:ext>
+          </a:extLst>
+        </p:cNvPr>
+        <p:cNvGrpSpPr/>
+        <p:nvPr/>
+      </p:nvGrpSpPr>
+      <p:grpSpPr>
+        <a:xfrm>
+          <a:off x="0" y="0"/>
+          <a:ext cx="0" cy="0"/>
+          <a:chOff x="0" y="0"/>
+          <a:chExt cx="0" cy="0"/>
+        </a:xfrm>
+      </p:grpSpPr>
+      <p:pic>
+        <p:nvPicPr>
+          <p:cNvPr id="3" name="Graphic 2">
+            <a:extLst>
+              <a:ext uri="{FF2B5EF4-FFF2-40B4-BE49-F238E27FC236}">
+                <a16:creationId xmlns:a16="http://schemas.microsoft.com/office/drawing/2014/main" id="{DCD3A61F-16FA-D9B9-FD8C-8117007F8357}"/>
+              </a:ext>
+            </a:extLst>
+          </p:cNvPr>
+          <p:cNvPicPr>
+            <a:picLocks noChangeAspect="1"/>
+          </p:cNvPicPr>
+          <p:nvPr/>
+        </p:nvPicPr>
+        <p:blipFill>
+          <a:blip r:embed="rId3">
+            <a:extLst>
+              <a:ext uri="{96DAC541-7B7A-43D3-8B79-37D633B846F1}">
+                <asvg:svgBlip xmlns:asvg="http://schemas.microsoft.com/office/drawing/2016/SVG/main" r:embed="rId4"/>
+              </a:ext>
+            </a:extLst>
+          </a:blip>
+          <a:stretch>
+            <a:fillRect/>
+          </a:stretch>
+        </p:blipFill>
+        <p:spPr>
+          <a:xfrm>
+            <a:off x="0" y="0"/>
+            <a:ext cx="36576000" cy="32918400"/>
+          </a:xfrm>
+          <a:prstGeom prst="rect">
+            <a:avLst/>
+          </a:prstGeom>
+        </p:spPr>
+      </p:pic>
+    </p:spTree>
+    <p:extLst>
+      <p:ext uri="{BB962C8B-B14F-4D97-AF65-F5344CB8AC3E}">
+        <p14:creationId xmlns:p14="http://schemas.microsoft.com/office/powerpoint/2010/main" val="427030774"/>
+      </p:ext>
+    </p:extLst>
+  </p:cSld>
+  <p:clrMapOvr>
+    <a:masterClrMapping/>
+  </p:clrMapOvr>
+</p:sld>
+</file>
+
 <file path=ppt/theme/theme1.xml><?xml version="1.0" encoding="utf-8"?>
 <a:theme xmlns:a="http://schemas.openxmlformats.org/drawingml/2006/main" name="Office Theme">
   <a:themeElements>

</xml_diff>